<commit_message>
updating Java examples for Days 11-15
</commit_message>
<xml_diff>
--- a/revised-ppts/Day 15 PPT.pptx
+++ b/revised-ppts/Day 15 PPT.pptx
@@ -2,42 +2,42 @@
 <file path=ppt/presentation.xml><?xml version="1.0" encoding="utf-8"?>
 <p:presentation xmlns:a="http://schemas.openxmlformats.org/drawingml/2006/main" xmlns:r="http://schemas.openxmlformats.org/officeDocument/2006/relationships" xmlns:p="http://schemas.openxmlformats.org/presentationml/2006/main" firstSlideNum="0" strictFirstAndLastChars="0" saveSubsetFonts="1" autoCompressPictures="0">
   <p:sldMasterIdLst>
-    <p:sldMasterId id="2147483661" r:id="rId1"/>
+    <p:sldMasterId id="2147483661" r:id="rId4"/>
   </p:sldMasterIdLst>
   <p:notesMasterIdLst>
-    <p:notesMasterId r:id="rId32"/>
+    <p:notesMasterId r:id="rId35"/>
   </p:notesMasterIdLst>
   <p:sldIdLst>
-    <p:sldId id="256" r:id="rId2"/>
-    <p:sldId id="282" r:id="rId3"/>
-    <p:sldId id="285" r:id="rId4"/>
-    <p:sldId id="294" r:id="rId5"/>
-    <p:sldId id="275" r:id="rId6"/>
-    <p:sldId id="276" r:id="rId7"/>
-    <p:sldId id="295" r:id="rId8"/>
-    <p:sldId id="287" r:id="rId9"/>
-    <p:sldId id="296" r:id="rId10"/>
-    <p:sldId id="297" r:id="rId11"/>
-    <p:sldId id="298" r:id="rId12"/>
-    <p:sldId id="299" r:id="rId13"/>
-    <p:sldId id="267" r:id="rId14"/>
-    <p:sldId id="269" r:id="rId15"/>
-    <p:sldId id="268" r:id="rId16"/>
-    <p:sldId id="300" r:id="rId17"/>
-    <p:sldId id="283" r:id="rId18"/>
-    <p:sldId id="281" r:id="rId19"/>
-    <p:sldId id="273" r:id="rId20"/>
-    <p:sldId id="274" r:id="rId21"/>
-    <p:sldId id="284" r:id="rId22"/>
-    <p:sldId id="257" r:id="rId23"/>
-    <p:sldId id="277" r:id="rId24"/>
-    <p:sldId id="258" r:id="rId25"/>
-    <p:sldId id="289" r:id="rId26"/>
-    <p:sldId id="278" r:id="rId27"/>
-    <p:sldId id="262" r:id="rId28"/>
-    <p:sldId id="293" r:id="rId29"/>
-    <p:sldId id="286" r:id="rId30"/>
-    <p:sldId id="272" r:id="rId31"/>
+    <p:sldId id="256" r:id="rId5"/>
+    <p:sldId id="282" r:id="rId6"/>
+    <p:sldId id="285" r:id="rId7"/>
+    <p:sldId id="294" r:id="rId8"/>
+    <p:sldId id="275" r:id="rId9"/>
+    <p:sldId id="276" r:id="rId10"/>
+    <p:sldId id="295" r:id="rId11"/>
+    <p:sldId id="287" r:id="rId12"/>
+    <p:sldId id="296" r:id="rId13"/>
+    <p:sldId id="297" r:id="rId14"/>
+    <p:sldId id="298" r:id="rId15"/>
+    <p:sldId id="299" r:id="rId16"/>
+    <p:sldId id="267" r:id="rId17"/>
+    <p:sldId id="269" r:id="rId18"/>
+    <p:sldId id="268" r:id="rId19"/>
+    <p:sldId id="300" r:id="rId20"/>
+    <p:sldId id="283" r:id="rId21"/>
+    <p:sldId id="281" r:id="rId22"/>
+    <p:sldId id="273" r:id="rId23"/>
+    <p:sldId id="274" r:id="rId24"/>
+    <p:sldId id="284" r:id="rId25"/>
+    <p:sldId id="257" r:id="rId26"/>
+    <p:sldId id="277" r:id="rId27"/>
+    <p:sldId id="258" r:id="rId28"/>
+    <p:sldId id="289" r:id="rId29"/>
+    <p:sldId id="278" r:id="rId30"/>
+    <p:sldId id="262" r:id="rId31"/>
+    <p:sldId id="293" r:id="rId32"/>
+    <p:sldId id="286" r:id="rId33"/>
+    <p:sldId id="272" r:id="rId34"/>
   </p:sldIdLst>
   <p:sldSz cx="9144000" cy="6858000" type="screen4x3"/>
   <p:notesSz cx="7010400" cy="9296400"/>
@@ -703,140 +703,6 @@
     </pc:docChg>
   </pc:docChgLst>
   <pc:docChgLst>
-    <pc:chgData name="Joseph Highe" userId="S::joseph.highe@revature.com::955b9bf1-2fc3-425c-bb80-056211376f04" providerId="AD" clId="Web-{10C310BF-F551-0215-7D17-CE173A4BBDCC}"/>
-    <pc:docChg chg="addSld modSld">
-      <pc:chgData name="Joseph Highe" userId="S::joseph.highe@revature.com::955b9bf1-2fc3-425c-bb80-056211376f04" providerId="AD" clId="Web-{10C310BF-F551-0215-7D17-CE173A4BBDCC}" dt="2021-12-24T17:05:49.331" v="459" actId="14100"/>
-      <pc:docMkLst>
-        <pc:docMk/>
-      </pc:docMkLst>
-      <pc:sldChg chg="modSp">
-        <pc:chgData name="Joseph Highe" userId="S::joseph.highe@revature.com::955b9bf1-2fc3-425c-bb80-056211376f04" providerId="AD" clId="Web-{10C310BF-F551-0215-7D17-CE173A4BBDCC}" dt="2021-12-24T16:48:27.462" v="49" actId="20577"/>
-        <pc:sldMkLst>
-          <pc:docMk/>
-          <pc:sldMk cId="0" sldId="262"/>
-        </pc:sldMkLst>
-        <pc:spChg chg="mod">
-          <ac:chgData name="Joseph Highe" userId="S::joseph.highe@revature.com::955b9bf1-2fc3-425c-bb80-056211376f04" providerId="AD" clId="Web-{10C310BF-F551-0215-7D17-CE173A4BBDCC}" dt="2021-12-24T16:48:18.853" v="47" actId="1076"/>
-          <ac:spMkLst>
-            <pc:docMk/>
-            <pc:sldMk cId="0" sldId="262"/>
-            <ac:spMk id="6" creationId="{5CCE257A-38BD-4F10-8176-6373BF55BA2A}"/>
-          </ac:spMkLst>
-        </pc:spChg>
-        <pc:spChg chg="mod">
-          <ac:chgData name="Joseph Highe" userId="S::joseph.highe@revature.com::955b9bf1-2fc3-425c-bb80-056211376f04" providerId="AD" clId="Web-{10C310BF-F551-0215-7D17-CE173A4BBDCC}" dt="2021-12-24T16:48:23.134" v="48" actId="1076"/>
-          <ac:spMkLst>
-            <pc:docMk/>
-            <pc:sldMk cId="0" sldId="262"/>
-            <ac:spMk id="7" creationId="{1A3779DF-3EE1-4B7F-8555-C8D3593FFED9}"/>
-          </ac:spMkLst>
-        </pc:spChg>
-        <pc:spChg chg="mod">
-          <ac:chgData name="Joseph Highe" userId="S::joseph.highe@revature.com::955b9bf1-2fc3-425c-bb80-056211376f04" providerId="AD" clId="Web-{10C310BF-F551-0215-7D17-CE173A4BBDCC}" dt="2021-12-24T16:48:27.462" v="49" actId="20577"/>
-          <ac:spMkLst>
-            <pc:docMk/>
-            <pc:sldMk cId="0" sldId="262"/>
-            <ac:spMk id="254" creationId="{00000000-0000-0000-0000-000000000000}"/>
-          </ac:spMkLst>
-        </pc:spChg>
-      </pc:sldChg>
-      <pc:sldChg chg="addSp delSp modSp add replId">
-        <pc:chgData name="Joseph Highe" userId="S::joseph.highe@revature.com::955b9bf1-2fc3-425c-bb80-056211376f04" providerId="AD" clId="Web-{10C310BF-F551-0215-7D17-CE173A4BBDCC}" dt="2021-12-24T17:05:49.331" v="459" actId="14100"/>
-        <pc:sldMkLst>
-          <pc:docMk/>
-          <pc:sldMk cId="2163507849" sldId="294"/>
-        </pc:sldMkLst>
-        <pc:spChg chg="del">
-          <ac:chgData name="Joseph Highe" userId="S::joseph.highe@revature.com::955b9bf1-2fc3-425c-bb80-056211376f04" providerId="AD" clId="Web-{10C310BF-F551-0215-7D17-CE173A4BBDCC}" dt="2021-12-24T16:49:41.338" v="51"/>
-          <ac:spMkLst>
-            <pc:docMk/>
-            <pc:sldMk cId="2163507849" sldId="294"/>
-            <ac:spMk id="3" creationId="{CA870295-970A-4734-B83A-E32B1B7CC83E}"/>
-          </ac:spMkLst>
-        </pc:spChg>
-        <pc:spChg chg="add del mod">
-          <ac:chgData name="Joseph Highe" userId="S::joseph.highe@revature.com::955b9bf1-2fc3-425c-bb80-056211376f04" providerId="AD" clId="Web-{10C310BF-F551-0215-7D17-CE173A4BBDCC}" dt="2021-12-24T16:49:46.854" v="54"/>
-          <ac:spMkLst>
-            <pc:docMk/>
-            <pc:sldMk cId="2163507849" sldId="294"/>
-            <ac:spMk id="6" creationId="{3695CAE3-7743-4864-B857-15D12125EA95}"/>
-          </ac:spMkLst>
-        </pc:spChg>
-        <pc:spChg chg="add del mod">
-          <ac:chgData name="Joseph Highe" userId="S::joseph.highe@revature.com::955b9bf1-2fc3-425c-bb80-056211376f04" providerId="AD" clId="Web-{10C310BF-F551-0215-7D17-CE173A4BBDCC}" dt="2021-12-24T16:55:58.161" v="188"/>
-          <ac:spMkLst>
-            <pc:docMk/>
-            <pc:sldMk cId="2163507849" sldId="294"/>
-            <ac:spMk id="8" creationId="{F6A7CD23-4176-4A80-ACAE-55590C8BBFFA}"/>
-          </ac:spMkLst>
-        </pc:spChg>
-        <pc:spChg chg="add mod">
-          <ac:chgData name="Joseph Highe" userId="S::joseph.highe@revature.com::955b9bf1-2fc3-425c-bb80-056211376f04" providerId="AD" clId="Web-{10C310BF-F551-0215-7D17-CE173A4BBDCC}" dt="2021-12-24T17:05:34.456" v="457" actId="1076"/>
-          <ac:spMkLst>
-            <pc:docMk/>
-            <pc:sldMk cId="2163507849" sldId="294"/>
-            <ac:spMk id="10" creationId="{AB67DE77-F187-47EC-A611-083F2D66EAE7}"/>
-          </ac:spMkLst>
-        </pc:spChg>
-        <pc:spChg chg="add mod">
-          <ac:chgData name="Joseph Highe" userId="S::joseph.highe@revature.com::955b9bf1-2fc3-425c-bb80-056211376f04" providerId="AD" clId="Web-{10C310BF-F551-0215-7D17-CE173A4BBDCC}" dt="2021-12-24T17:05:49.331" v="459" actId="14100"/>
-          <ac:spMkLst>
-            <pc:docMk/>
-            <pc:sldMk cId="2163507849" sldId="294"/>
-            <ac:spMk id="11" creationId="{9CC98ADD-CAB9-47EB-87D6-4AF431D707D9}"/>
-          </ac:spMkLst>
-        </pc:spChg>
-      </pc:sldChg>
-    </pc:docChg>
-  </pc:docChgLst>
-  <pc:docChgLst>
-    <pc:chgData name="Cynthia Enciso" userId="7915927f-c5cf-4e1f-876d-e79882ad52fa" providerId="ADAL" clId="{007E3B92-AEC5-49E9-A0ED-D9E41C77BCEC}"/>
-    <pc:docChg chg="custSel modSld">
-      <pc:chgData name="Cynthia Enciso" userId="7915927f-c5cf-4e1f-876d-e79882ad52fa" providerId="ADAL" clId="{007E3B92-AEC5-49E9-A0ED-D9E41C77BCEC}" dt="2021-12-27T20:43:27.215" v="115" actId="20577"/>
-      <pc:docMkLst>
-        <pc:docMk/>
-      </pc:docMkLst>
-      <pc:sldChg chg="addSp delSp modSp mod">
-        <pc:chgData name="Cynthia Enciso" userId="7915927f-c5cf-4e1f-876d-e79882ad52fa" providerId="ADAL" clId="{007E3B92-AEC5-49E9-A0ED-D9E41C77BCEC}" dt="2021-12-14T21:48:58.242" v="2"/>
-        <pc:sldMkLst>
-          <pc:docMk/>
-          <pc:sldMk cId="0" sldId="259"/>
-        </pc:sldMkLst>
-        <pc:spChg chg="add mod">
-          <ac:chgData name="Cynthia Enciso" userId="7915927f-c5cf-4e1f-876d-e79882ad52fa" providerId="ADAL" clId="{007E3B92-AEC5-49E9-A0ED-D9E41C77BCEC}" dt="2021-12-14T21:48:58.242" v="2"/>
-          <ac:spMkLst>
-            <pc:docMk/>
-            <pc:sldMk cId="0" sldId="259"/>
-            <ac:spMk id="6" creationId="{9CB3CF3A-4EB5-4C02-A6F6-3ED9D20DEDAC}"/>
-          </ac:spMkLst>
-        </pc:spChg>
-        <pc:spChg chg="del mod">
-          <ac:chgData name="Cynthia Enciso" userId="7915927f-c5cf-4e1f-876d-e79882ad52fa" providerId="ADAL" clId="{007E3B92-AEC5-49E9-A0ED-D9E41C77BCEC}" dt="2021-12-14T21:48:57.965" v="1" actId="478"/>
-          <ac:spMkLst>
-            <pc:docMk/>
-            <pc:sldMk cId="0" sldId="259"/>
-            <ac:spMk id="7" creationId="{E58A825B-5F0A-4223-9EE9-4074AE300333}"/>
-          </ac:spMkLst>
-        </pc:spChg>
-      </pc:sldChg>
-      <pc:sldChg chg="modSp mod">
-        <pc:chgData name="Cynthia Enciso" userId="7915927f-c5cf-4e1f-876d-e79882ad52fa" providerId="ADAL" clId="{007E3B92-AEC5-49E9-A0ED-D9E41C77BCEC}" dt="2021-12-27T20:43:27.215" v="115" actId="20577"/>
-        <pc:sldMkLst>
-          <pc:docMk/>
-          <pc:sldMk cId="0" sldId="261"/>
-        </pc:sldMkLst>
-        <pc:spChg chg="mod">
-          <ac:chgData name="Cynthia Enciso" userId="7915927f-c5cf-4e1f-876d-e79882ad52fa" providerId="ADAL" clId="{007E3B92-AEC5-49E9-A0ED-D9E41C77BCEC}" dt="2021-12-27T20:43:27.215" v="115" actId="20577"/>
-          <ac:spMkLst>
-            <pc:docMk/>
-            <pc:sldMk cId="0" sldId="261"/>
-            <ac:spMk id="247" creationId="{00000000-0000-0000-0000-000000000000}"/>
-          </ac:spMkLst>
-        </pc:spChg>
-      </pc:sldChg>
-    </pc:docChg>
-  </pc:docChgLst>
-  <pc:docChgLst>
     <pc:chgData name="Cynthia Enciso" userId="7915927f-c5cf-4e1f-876d-e79882ad52fa" providerId="ADAL" clId="{B200A48C-31DA-410A-B849-C7CB8400393E}"/>
     <pc:docChg chg="custSel addSld delSld modSld sldOrd">
       <pc:chgData name="Cynthia Enciso" userId="7915927f-c5cf-4e1f-876d-e79882ad52fa" providerId="ADAL" clId="{B200A48C-31DA-410A-B849-C7CB8400393E}" dt="2021-09-23T21:11:18.049" v="423" actId="47"/>
@@ -945,364 +811,6 @@
             <ac:spMk id="3" creationId="{F9EBCC94-BE62-42DC-A27D-16B087F7B97F}"/>
           </ac:spMkLst>
         </pc:spChg>
-      </pc:sldChg>
-    </pc:docChg>
-  </pc:docChgLst>
-  <pc:docChgLst>
-    <pc:chgData name="Cynthia Enciso" userId="7915927f-c5cf-4e1f-876d-e79882ad52fa" providerId="ADAL" clId="{A5DF6FD7-8000-40B2-B46A-A2B0A7504C35}"/>
-    <pc:docChg chg="undo custSel addSld delSld modSld sldOrd">
-      <pc:chgData name="Cynthia Enciso" userId="7915927f-c5cf-4e1f-876d-e79882ad52fa" providerId="ADAL" clId="{A5DF6FD7-8000-40B2-B46A-A2B0A7504C35}" dt="2021-05-13T21:09:00.823" v="784" actId="1076"/>
-      <pc:docMkLst>
-        <pc:docMk/>
-      </pc:docMkLst>
-      <pc:sldChg chg="ord">
-        <pc:chgData name="Cynthia Enciso" userId="7915927f-c5cf-4e1f-876d-e79882ad52fa" providerId="ADAL" clId="{A5DF6FD7-8000-40B2-B46A-A2B0A7504C35}" dt="2021-05-13T13:10:11.368" v="719"/>
-        <pc:sldMkLst>
-          <pc:docMk/>
-          <pc:sldMk cId="0" sldId="259"/>
-        </pc:sldMkLst>
-      </pc:sldChg>
-      <pc:sldChg chg="ord">
-        <pc:chgData name="Cynthia Enciso" userId="7915927f-c5cf-4e1f-876d-e79882ad52fa" providerId="ADAL" clId="{A5DF6FD7-8000-40B2-B46A-A2B0A7504C35}" dt="2021-05-13T13:09:10.027" v="717"/>
-        <pc:sldMkLst>
-          <pc:docMk/>
-          <pc:sldMk cId="0" sldId="260"/>
-        </pc:sldMkLst>
-      </pc:sldChg>
-      <pc:sldChg chg="addSp modSp mod">
-        <pc:chgData name="Cynthia Enciso" userId="7915927f-c5cf-4e1f-876d-e79882ad52fa" providerId="ADAL" clId="{A5DF6FD7-8000-40B2-B46A-A2B0A7504C35}" dt="2021-05-13T13:58:36.042" v="754" actId="20577"/>
-        <pc:sldMkLst>
-          <pc:docMk/>
-          <pc:sldMk cId="0" sldId="263"/>
-        </pc:sldMkLst>
-        <pc:spChg chg="add mod">
-          <ac:chgData name="Cynthia Enciso" userId="7915927f-c5cf-4e1f-876d-e79882ad52fa" providerId="ADAL" clId="{A5DF6FD7-8000-40B2-B46A-A2B0A7504C35}" dt="2021-05-13T13:58:36.042" v="754" actId="20577"/>
-          <ac:spMkLst>
-            <pc:docMk/>
-            <pc:sldMk cId="0" sldId="263"/>
-            <ac:spMk id="2" creationId="{5C5A2562-1FAD-487B-95C6-159422001AAD}"/>
-          </ac:spMkLst>
-        </pc:spChg>
-      </pc:sldChg>
-      <pc:sldChg chg="modSp del mod">
-        <pc:chgData name="Cynthia Enciso" userId="7915927f-c5cf-4e1f-876d-e79882ad52fa" providerId="ADAL" clId="{A5DF6FD7-8000-40B2-B46A-A2B0A7504C35}" dt="2021-05-13T15:09:37.501" v="756" actId="47"/>
-        <pc:sldMkLst>
-          <pc:docMk/>
-          <pc:sldMk cId="0" sldId="265"/>
-        </pc:sldMkLst>
-        <pc:spChg chg="mod">
-          <ac:chgData name="Cynthia Enciso" userId="7915927f-c5cf-4e1f-876d-e79882ad52fa" providerId="ADAL" clId="{A5DF6FD7-8000-40B2-B46A-A2B0A7504C35}" dt="2021-05-13T15:03:53.591" v="755" actId="20577"/>
-          <ac:spMkLst>
-            <pc:docMk/>
-            <pc:sldMk cId="0" sldId="265"/>
-            <ac:spMk id="275" creationId="{00000000-0000-0000-0000-000000000000}"/>
-          </ac:spMkLst>
-        </pc:spChg>
-      </pc:sldChg>
-      <pc:sldChg chg="del">
-        <pc:chgData name="Cynthia Enciso" userId="7915927f-c5cf-4e1f-876d-e79882ad52fa" providerId="ADAL" clId="{A5DF6FD7-8000-40B2-B46A-A2B0A7504C35}" dt="2021-05-13T15:09:37.501" v="756" actId="47"/>
-        <pc:sldMkLst>
-          <pc:docMk/>
-          <pc:sldMk cId="0" sldId="266"/>
-        </pc:sldMkLst>
-      </pc:sldChg>
-      <pc:sldChg chg="addSp modSp mod">
-        <pc:chgData name="Cynthia Enciso" userId="7915927f-c5cf-4e1f-876d-e79882ad52fa" providerId="ADAL" clId="{A5DF6FD7-8000-40B2-B46A-A2B0A7504C35}" dt="2021-05-13T01:07:56.412" v="691" actId="20577"/>
-        <pc:sldMkLst>
-          <pc:docMk/>
-          <pc:sldMk cId="161632373" sldId="274"/>
-        </pc:sldMkLst>
-        <pc:spChg chg="add mod">
-          <ac:chgData name="Cynthia Enciso" userId="7915927f-c5cf-4e1f-876d-e79882ad52fa" providerId="ADAL" clId="{A5DF6FD7-8000-40B2-B46A-A2B0A7504C35}" dt="2021-05-13T01:07:56.412" v="691" actId="20577"/>
-          <ac:spMkLst>
-            <pc:docMk/>
-            <pc:sldMk cId="161632373" sldId="274"/>
-            <ac:spMk id="9" creationId="{03DAEC70-3A98-40F4-9BA8-7EC62A9DF887}"/>
-          </ac:spMkLst>
-        </pc:spChg>
-      </pc:sldChg>
-      <pc:sldChg chg="addSp modSp mod">
-        <pc:chgData name="Cynthia Enciso" userId="7915927f-c5cf-4e1f-876d-e79882ad52fa" providerId="ADAL" clId="{A5DF6FD7-8000-40B2-B46A-A2B0A7504C35}" dt="2021-05-13T01:08:02.824" v="702" actId="20577"/>
-        <pc:sldMkLst>
-          <pc:docMk/>
-          <pc:sldMk cId="2217254208" sldId="275"/>
-        </pc:sldMkLst>
-        <pc:spChg chg="add mod">
-          <ac:chgData name="Cynthia Enciso" userId="7915927f-c5cf-4e1f-876d-e79882ad52fa" providerId="ADAL" clId="{A5DF6FD7-8000-40B2-B46A-A2B0A7504C35}" dt="2021-05-13T01:08:02.824" v="702" actId="20577"/>
-          <ac:spMkLst>
-            <pc:docMk/>
-            <pc:sldMk cId="2217254208" sldId="275"/>
-            <ac:spMk id="3" creationId="{C3EC13CC-447D-4522-A147-EA6C7635768A}"/>
-          </ac:spMkLst>
-        </pc:spChg>
-        <pc:spChg chg="mod">
-          <ac:chgData name="Cynthia Enciso" userId="7915927f-c5cf-4e1f-876d-e79882ad52fa" providerId="ADAL" clId="{A5DF6FD7-8000-40B2-B46A-A2B0A7504C35}" dt="2021-05-13T00:37:41.840" v="671" actId="20577"/>
-          <ac:spMkLst>
-            <pc:docMk/>
-            <pc:sldMk cId="2217254208" sldId="275"/>
-            <ac:spMk id="6" creationId="{72C87E29-33CF-4D38-A874-906BF9E470BF}"/>
-          </ac:spMkLst>
-        </pc:spChg>
-      </pc:sldChg>
-      <pc:sldChg chg="addSp delSp modSp mod">
-        <pc:chgData name="Cynthia Enciso" userId="7915927f-c5cf-4e1f-876d-e79882ad52fa" providerId="ADAL" clId="{A5DF6FD7-8000-40B2-B46A-A2B0A7504C35}" dt="2021-05-12T19:06:37.231" v="667" actId="478"/>
-        <pc:sldMkLst>
-          <pc:docMk/>
-          <pc:sldMk cId="401115519" sldId="277"/>
-        </pc:sldMkLst>
-        <pc:spChg chg="add del mod">
-          <ac:chgData name="Cynthia Enciso" userId="7915927f-c5cf-4e1f-876d-e79882ad52fa" providerId="ADAL" clId="{A5DF6FD7-8000-40B2-B46A-A2B0A7504C35}" dt="2021-05-12T19:06:37.231" v="667" actId="478"/>
-          <ac:spMkLst>
-            <pc:docMk/>
-            <pc:sldMk cId="401115519" sldId="277"/>
-            <ac:spMk id="5" creationId="{BC2AC9E1-5FF1-43E6-A0E8-B98739FF59F5}"/>
-          </ac:spMkLst>
-        </pc:spChg>
-        <pc:spChg chg="add del mod">
-          <ac:chgData name="Cynthia Enciso" userId="7915927f-c5cf-4e1f-876d-e79882ad52fa" providerId="ADAL" clId="{A5DF6FD7-8000-40B2-B46A-A2B0A7504C35}" dt="2021-05-12T19:06:37.231" v="667" actId="478"/>
-          <ac:spMkLst>
-            <pc:docMk/>
-            <pc:sldMk cId="401115519" sldId="277"/>
-            <ac:spMk id="7" creationId="{00EC28CE-D4D5-492D-99E6-ADF60DAED5E0}"/>
-          </ac:spMkLst>
-        </pc:spChg>
-        <pc:spChg chg="add del mod">
-          <ac:chgData name="Cynthia Enciso" userId="7915927f-c5cf-4e1f-876d-e79882ad52fa" providerId="ADAL" clId="{A5DF6FD7-8000-40B2-B46A-A2B0A7504C35}" dt="2021-05-12T19:06:37.231" v="667" actId="478"/>
-          <ac:spMkLst>
-            <pc:docMk/>
-            <pc:sldMk cId="401115519" sldId="277"/>
-            <ac:spMk id="8" creationId="{16F8A9BF-D0A2-490B-8565-F84394B39199}"/>
-          </ac:spMkLst>
-        </pc:spChg>
-        <pc:spChg chg="add del mod">
-          <ac:chgData name="Cynthia Enciso" userId="7915927f-c5cf-4e1f-876d-e79882ad52fa" providerId="ADAL" clId="{A5DF6FD7-8000-40B2-B46A-A2B0A7504C35}" dt="2021-05-12T19:06:37.231" v="667" actId="478"/>
-          <ac:spMkLst>
-            <pc:docMk/>
-            <pc:sldMk cId="401115519" sldId="277"/>
-            <ac:spMk id="9" creationId="{8BACB54F-3215-461C-A98B-1DE17A74FF38}"/>
-          </ac:spMkLst>
-        </pc:spChg>
-        <pc:spChg chg="add del mod">
-          <ac:chgData name="Cynthia Enciso" userId="7915927f-c5cf-4e1f-876d-e79882ad52fa" providerId="ADAL" clId="{A5DF6FD7-8000-40B2-B46A-A2B0A7504C35}" dt="2021-05-12T19:06:37.231" v="667" actId="478"/>
-          <ac:spMkLst>
-            <pc:docMk/>
-            <pc:sldMk cId="401115519" sldId="277"/>
-            <ac:spMk id="10" creationId="{ED48520D-C161-42FA-91D2-F3CA20229511}"/>
-          </ac:spMkLst>
-        </pc:spChg>
-        <pc:spChg chg="add del mod">
-          <ac:chgData name="Cynthia Enciso" userId="7915927f-c5cf-4e1f-876d-e79882ad52fa" providerId="ADAL" clId="{A5DF6FD7-8000-40B2-B46A-A2B0A7504C35}" dt="2021-05-12T19:06:37.231" v="667" actId="478"/>
-          <ac:spMkLst>
-            <pc:docMk/>
-            <pc:sldMk cId="401115519" sldId="277"/>
-            <ac:spMk id="11" creationId="{79A09644-5AC3-49B4-A590-142F3077640A}"/>
-          </ac:spMkLst>
-        </pc:spChg>
-        <pc:spChg chg="add del mod">
-          <ac:chgData name="Cynthia Enciso" userId="7915927f-c5cf-4e1f-876d-e79882ad52fa" providerId="ADAL" clId="{A5DF6FD7-8000-40B2-B46A-A2B0A7504C35}" dt="2021-05-12T19:06:37.231" v="667" actId="478"/>
-          <ac:spMkLst>
-            <pc:docMk/>
-            <pc:sldMk cId="401115519" sldId="277"/>
-            <ac:spMk id="12" creationId="{58127662-FDB3-484E-8C82-4DE4158F794C}"/>
-          </ac:spMkLst>
-        </pc:spChg>
-        <pc:spChg chg="add del mod">
-          <ac:chgData name="Cynthia Enciso" userId="7915927f-c5cf-4e1f-876d-e79882ad52fa" providerId="ADAL" clId="{A5DF6FD7-8000-40B2-B46A-A2B0A7504C35}" dt="2021-05-12T18:26:09.847" v="354"/>
-          <ac:spMkLst>
-            <pc:docMk/>
-            <pc:sldMk cId="401115519" sldId="277"/>
-            <ac:spMk id="13" creationId="{3A882556-C4C2-41C1-94B6-44156227BF34}"/>
-          </ac:spMkLst>
-        </pc:spChg>
-        <pc:spChg chg="add del mod">
-          <ac:chgData name="Cynthia Enciso" userId="7915927f-c5cf-4e1f-876d-e79882ad52fa" providerId="ADAL" clId="{A5DF6FD7-8000-40B2-B46A-A2B0A7504C35}" dt="2021-05-12T19:06:37.231" v="667" actId="478"/>
-          <ac:spMkLst>
-            <pc:docMk/>
-            <pc:sldMk cId="401115519" sldId="277"/>
-            <ac:spMk id="14" creationId="{153AA97F-9544-4867-A96A-49975AB5E8E2}"/>
-          </ac:spMkLst>
-        </pc:spChg>
-        <pc:spChg chg="add del mod">
-          <ac:chgData name="Cynthia Enciso" userId="7915927f-c5cf-4e1f-876d-e79882ad52fa" providerId="ADAL" clId="{A5DF6FD7-8000-40B2-B46A-A2B0A7504C35}" dt="2021-05-12T19:06:37.231" v="667" actId="478"/>
-          <ac:spMkLst>
-            <pc:docMk/>
-            <pc:sldMk cId="401115519" sldId="277"/>
-            <ac:spMk id="15" creationId="{37E41A40-65C7-4F58-9BF1-ABAB0C95084F}"/>
-          </ac:spMkLst>
-        </pc:spChg>
-        <pc:spChg chg="add del mod">
-          <ac:chgData name="Cynthia Enciso" userId="7915927f-c5cf-4e1f-876d-e79882ad52fa" providerId="ADAL" clId="{A5DF6FD7-8000-40B2-B46A-A2B0A7504C35}" dt="2021-05-12T19:06:37.231" v="667" actId="478"/>
-          <ac:spMkLst>
-            <pc:docMk/>
-            <pc:sldMk cId="401115519" sldId="277"/>
-            <ac:spMk id="16" creationId="{DBF0276C-59F9-4DE3-BB5C-FB71F024D8FC}"/>
-          </ac:spMkLst>
-        </pc:spChg>
-        <pc:spChg chg="add del mod">
-          <ac:chgData name="Cynthia Enciso" userId="7915927f-c5cf-4e1f-876d-e79882ad52fa" providerId="ADAL" clId="{A5DF6FD7-8000-40B2-B46A-A2B0A7504C35}" dt="2021-05-12T19:06:37.231" v="667" actId="478"/>
-          <ac:spMkLst>
-            <pc:docMk/>
-            <pc:sldMk cId="401115519" sldId="277"/>
-            <ac:spMk id="17" creationId="{56DAA60E-AEED-4D1E-BAF1-D60B89B96368}"/>
-          </ac:spMkLst>
-        </pc:spChg>
-        <pc:spChg chg="add del mod">
-          <ac:chgData name="Cynthia Enciso" userId="7915927f-c5cf-4e1f-876d-e79882ad52fa" providerId="ADAL" clId="{A5DF6FD7-8000-40B2-B46A-A2B0A7504C35}" dt="2021-05-12T18:51:51.005" v="663" actId="478"/>
-          <ac:spMkLst>
-            <pc:docMk/>
-            <pc:sldMk cId="401115519" sldId="277"/>
-            <ac:spMk id="18" creationId="{F5B6587D-4033-4FF9-8573-0CDF4D84D5E1}"/>
-          </ac:spMkLst>
-        </pc:spChg>
-        <pc:spChg chg="add del">
-          <ac:chgData name="Cynthia Enciso" userId="7915927f-c5cf-4e1f-876d-e79882ad52fa" providerId="ADAL" clId="{A5DF6FD7-8000-40B2-B46A-A2B0A7504C35}" dt="2021-05-12T19:06:25.711" v="665" actId="22"/>
-          <ac:spMkLst>
-            <pc:docMk/>
-            <pc:sldMk cId="401115519" sldId="277"/>
-            <ac:spMk id="20" creationId="{AEBA135D-71F5-4C3A-B6BE-D6872FD06468}"/>
-          </ac:spMkLst>
-        </pc:spChg>
-      </pc:sldChg>
-      <pc:sldChg chg="addSp modSp mod">
-        <pc:chgData name="Cynthia Enciso" userId="7915927f-c5cf-4e1f-876d-e79882ad52fa" providerId="ADAL" clId="{A5DF6FD7-8000-40B2-B46A-A2B0A7504C35}" dt="2021-05-13T13:47:55.607" v="734" actId="5793"/>
-        <pc:sldMkLst>
-          <pc:docMk/>
-          <pc:sldMk cId="828568026" sldId="278"/>
-        </pc:sldMkLst>
-        <pc:spChg chg="add mod">
-          <ac:chgData name="Cynthia Enciso" userId="7915927f-c5cf-4e1f-876d-e79882ad52fa" providerId="ADAL" clId="{A5DF6FD7-8000-40B2-B46A-A2B0A7504C35}" dt="2021-05-13T13:47:55.607" v="734" actId="5793"/>
-          <ac:spMkLst>
-            <pc:docMk/>
-            <pc:sldMk cId="828568026" sldId="278"/>
-            <ac:spMk id="3" creationId="{AFFDEB83-A66E-4A4E-BAB1-870E0B7F82FC}"/>
-          </ac:spMkLst>
-        </pc:spChg>
-      </pc:sldChg>
-      <pc:sldChg chg="addSp modSp add del mod">
-        <pc:chgData name="Cynthia Enciso" userId="7915927f-c5cf-4e1f-876d-e79882ad52fa" providerId="ADAL" clId="{A5DF6FD7-8000-40B2-B46A-A2B0A7504C35}" dt="2021-05-13T20:48:20.141" v="757" actId="47"/>
-        <pc:sldMkLst>
-          <pc:docMk/>
-          <pc:sldMk cId="2118025839" sldId="280"/>
-        </pc:sldMkLst>
-        <pc:spChg chg="add mod">
-          <ac:chgData name="Cynthia Enciso" userId="7915927f-c5cf-4e1f-876d-e79882ad52fa" providerId="ADAL" clId="{A5DF6FD7-8000-40B2-B46A-A2B0A7504C35}" dt="2021-05-13T12:51:22.302" v="715" actId="1076"/>
-          <ac:spMkLst>
-            <pc:docMk/>
-            <pc:sldMk cId="2118025839" sldId="280"/>
-            <ac:spMk id="13" creationId="{47735A0F-0F31-459E-A4AC-84AA92B89ACC}"/>
-          </ac:spMkLst>
-        </pc:spChg>
-      </pc:sldChg>
-      <pc:sldChg chg="addSp delSp modSp new mod">
-        <pc:chgData name="Cynthia Enciso" userId="7915927f-c5cf-4e1f-876d-e79882ad52fa" providerId="ADAL" clId="{A5DF6FD7-8000-40B2-B46A-A2B0A7504C35}" dt="2021-05-13T21:09:00.823" v="784" actId="1076"/>
-        <pc:sldMkLst>
-          <pc:docMk/>
-          <pc:sldMk cId="2675953329" sldId="280"/>
-        </pc:sldMkLst>
-        <pc:spChg chg="del">
-          <ac:chgData name="Cynthia Enciso" userId="7915927f-c5cf-4e1f-876d-e79882ad52fa" providerId="ADAL" clId="{A5DF6FD7-8000-40B2-B46A-A2B0A7504C35}" dt="2021-05-13T21:06:37.891" v="759" actId="478"/>
-          <ac:spMkLst>
-            <pc:docMk/>
-            <pc:sldMk cId="2675953329" sldId="280"/>
-            <ac:spMk id="3" creationId="{CBCF5C6C-6E81-49DC-8008-DF8E74A8B8A9}"/>
-          </ac:spMkLst>
-        </pc:spChg>
-        <pc:spChg chg="add mod">
-          <ac:chgData name="Cynthia Enciso" userId="7915927f-c5cf-4e1f-876d-e79882ad52fa" providerId="ADAL" clId="{A5DF6FD7-8000-40B2-B46A-A2B0A7504C35}" dt="2021-05-13T21:06:42.714" v="761" actId="13822"/>
-          <ac:spMkLst>
-            <pc:docMk/>
-            <pc:sldMk cId="2675953329" sldId="280"/>
-            <ac:spMk id="5" creationId="{1BB1D7CF-36ED-426C-AF8C-F899B2DC8C5C}"/>
-          </ac:spMkLst>
-        </pc:spChg>
-        <pc:spChg chg="add mod">
-          <ac:chgData name="Cynthia Enciso" userId="7915927f-c5cf-4e1f-876d-e79882ad52fa" providerId="ADAL" clId="{A5DF6FD7-8000-40B2-B46A-A2B0A7504C35}" dt="2021-05-13T21:07:32.670" v="770" actId="14100"/>
-          <ac:spMkLst>
-            <pc:docMk/>
-            <pc:sldMk cId="2675953329" sldId="280"/>
-            <ac:spMk id="6" creationId="{1ABE50C8-E47E-4CC8-A329-20BD33C449B1}"/>
-          </ac:spMkLst>
-        </pc:spChg>
-        <pc:spChg chg="add mod">
-          <ac:chgData name="Cynthia Enciso" userId="7915927f-c5cf-4e1f-876d-e79882ad52fa" providerId="ADAL" clId="{A5DF6FD7-8000-40B2-B46A-A2B0A7504C35}" dt="2021-05-13T21:07:22.878" v="765" actId="1076"/>
-          <ac:spMkLst>
-            <pc:docMk/>
-            <pc:sldMk cId="2675953329" sldId="280"/>
-            <ac:spMk id="7" creationId="{14A97818-23E6-446C-AC14-D0A74D3CCFCC}"/>
-          </ac:spMkLst>
-        </pc:spChg>
-        <pc:spChg chg="add mod">
-          <ac:chgData name="Cynthia Enciso" userId="7915927f-c5cf-4e1f-876d-e79882ad52fa" providerId="ADAL" clId="{A5DF6FD7-8000-40B2-B46A-A2B0A7504C35}" dt="2021-05-13T21:07:24.971" v="766" actId="571"/>
-          <ac:spMkLst>
-            <pc:docMk/>
-            <pc:sldMk cId="2675953329" sldId="280"/>
-            <ac:spMk id="8" creationId="{1E819EEF-8215-4759-8EAF-EAD2218B1FB6}"/>
-          </ac:spMkLst>
-        </pc:spChg>
-        <pc:spChg chg="add mod">
-          <ac:chgData name="Cynthia Enciso" userId="7915927f-c5cf-4e1f-876d-e79882ad52fa" providerId="ADAL" clId="{A5DF6FD7-8000-40B2-B46A-A2B0A7504C35}" dt="2021-05-13T21:07:26.071" v="767" actId="571"/>
-          <ac:spMkLst>
-            <pc:docMk/>
-            <pc:sldMk cId="2675953329" sldId="280"/>
-            <ac:spMk id="9" creationId="{5850E483-D930-4C04-B412-79CA45D1AC8C}"/>
-          </ac:spMkLst>
-        </pc:spChg>
-        <pc:spChg chg="add mod">
-          <ac:chgData name="Cynthia Enciso" userId="7915927f-c5cf-4e1f-876d-e79882ad52fa" providerId="ADAL" clId="{A5DF6FD7-8000-40B2-B46A-A2B0A7504C35}" dt="2021-05-13T21:07:27.290" v="768" actId="571"/>
-          <ac:spMkLst>
-            <pc:docMk/>
-            <pc:sldMk cId="2675953329" sldId="280"/>
-            <ac:spMk id="10" creationId="{E1F90C20-0381-4F46-86C4-445E6E868350}"/>
-          </ac:spMkLst>
-        </pc:spChg>
-        <pc:spChg chg="add mod">
-          <ac:chgData name="Cynthia Enciso" userId="7915927f-c5cf-4e1f-876d-e79882ad52fa" providerId="ADAL" clId="{A5DF6FD7-8000-40B2-B46A-A2B0A7504C35}" dt="2021-05-13T21:07:29.794" v="769" actId="571"/>
-          <ac:spMkLst>
-            <pc:docMk/>
-            <pc:sldMk cId="2675953329" sldId="280"/>
-            <ac:spMk id="11" creationId="{03ECB692-08BE-4332-A356-DD47D370E3A8}"/>
-          </ac:spMkLst>
-        </pc:spChg>
-        <pc:spChg chg="add mod">
-          <ac:chgData name="Cynthia Enciso" userId="7915927f-c5cf-4e1f-876d-e79882ad52fa" providerId="ADAL" clId="{A5DF6FD7-8000-40B2-B46A-A2B0A7504C35}" dt="2021-05-13T21:08:08.110" v="775" actId="14100"/>
-          <ac:spMkLst>
-            <pc:docMk/>
-            <pc:sldMk cId="2675953329" sldId="280"/>
-            <ac:spMk id="12" creationId="{139B5649-7922-42CC-90E1-9C8F00DB11E8}"/>
-          </ac:spMkLst>
-        </pc:spChg>
-        <pc:spChg chg="add mod">
-          <ac:chgData name="Cynthia Enciso" userId="7915927f-c5cf-4e1f-876d-e79882ad52fa" providerId="ADAL" clId="{A5DF6FD7-8000-40B2-B46A-A2B0A7504C35}" dt="2021-05-13T21:08:42.485" v="779" actId="1076"/>
-          <ac:spMkLst>
-            <pc:docMk/>
-            <pc:sldMk cId="2675953329" sldId="280"/>
-            <ac:spMk id="13" creationId="{A108B2E6-09A8-4E0A-84B2-80BD7AC04147}"/>
-          </ac:spMkLst>
-        </pc:spChg>
-        <pc:spChg chg="add mod">
-          <ac:chgData name="Cynthia Enciso" userId="7915927f-c5cf-4e1f-876d-e79882ad52fa" providerId="ADAL" clId="{A5DF6FD7-8000-40B2-B46A-A2B0A7504C35}" dt="2021-05-13T21:09:00.823" v="784" actId="1076"/>
-          <ac:spMkLst>
-            <pc:docMk/>
-            <pc:sldMk cId="2675953329" sldId="280"/>
-            <ac:spMk id="17" creationId="{87B37B94-B12E-46E4-98C5-A102FFB69452}"/>
-          </ac:spMkLst>
-        </pc:spChg>
-        <pc:cxnChg chg="add mod">
-          <ac:chgData name="Cynthia Enciso" userId="7915927f-c5cf-4e1f-876d-e79882ad52fa" providerId="ADAL" clId="{A5DF6FD7-8000-40B2-B46A-A2B0A7504C35}" dt="2021-05-13T21:08:41.357" v="778" actId="14100"/>
-          <ac:cxnSpMkLst>
-            <pc:docMk/>
-            <pc:sldMk cId="2675953329" sldId="280"/>
-            <ac:cxnSpMk id="15" creationId="{62F06C4F-5EC5-44C4-92A3-A8EA05733A34}"/>
-          </ac:cxnSpMkLst>
-        </pc:cxnChg>
-        <pc:cxnChg chg="add del mod">
-          <ac:chgData name="Cynthia Enciso" userId="7915927f-c5cf-4e1f-876d-e79882ad52fa" providerId="ADAL" clId="{A5DF6FD7-8000-40B2-B46A-A2B0A7504C35}" dt="2021-05-13T21:08:54.386" v="783" actId="478"/>
-          <ac:cxnSpMkLst>
-            <pc:docMk/>
-            <pc:sldMk cId="2675953329" sldId="280"/>
-            <ac:cxnSpMk id="18" creationId="{37CF9E88-0FC8-4355-B7BE-B0499C706A27}"/>
-          </ac:cxnSpMkLst>
-        </pc:cxnChg>
       </pc:sldChg>
     </pc:docChg>
   </pc:docChgLst>
@@ -2160,6 +1668,364 @@
     </pc:docChg>
   </pc:docChgLst>
   <pc:docChgLst>
+    <pc:chgData name="Cynthia Enciso" userId="7915927f-c5cf-4e1f-876d-e79882ad52fa" providerId="ADAL" clId="{A5DF6FD7-8000-40B2-B46A-A2B0A7504C35}"/>
+    <pc:docChg chg="undo custSel addSld delSld modSld sldOrd">
+      <pc:chgData name="Cynthia Enciso" userId="7915927f-c5cf-4e1f-876d-e79882ad52fa" providerId="ADAL" clId="{A5DF6FD7-8000-40B2-B46A-A2B0A7504C35}" dt="2021-05-13T21:09:00.823" v="784" actId="1076"/>
+      <pc:docMkLst>
+        <pc:docMk/>
+      </pc:docMkLst>
+      <pc:sldChg chg="ord">
+        <pc:chgData name="Cynthia Enciso" userId="7915927f-c5cf-4e1f-876d-e79882ad52fa" providerId="ADAL" clId="{A5DF6FD7-8000-40B2-B46A-A2B0A7504C35}" dt="2021-05-13T13:10:11.368" v="719"/>
+        <pc:sldMkLst>
+          <pc:docMk/>
+          <pc:sldMk cId="0" sldId="259"/>
+        </pc:sldMkLst>
+      </pc:sldChg>
+      <pc:sldChg chg="ord">
+        <pc:chgData name="Cynthia Enciso" userId="7915927f-c5cf-4e1f-876d-e79882ad52fa" providerId="ADAL" clId="{A5DF6FD7-8000-40B2-B46A-A2B0A7504C35}" dt="2021-05-13T13:09:10.027" v="717"/>
+        <pc:sldMkLst>
+          <pc:docMk/>
+          <pc:sldMk cId="0" sldId="260"/>
+        </pc:sldMkLst>
+      </pc:sldChg>
+      <pc:sldChg chg="addSp modSp mod">
+        <pc:chgData name="Cynthia Enciso" userId="7915927f-c5cf-4e1f-876d-e79882ad52fa" providerId="ADAL" clId="{A5DF6FD7-8000-40B2-B46A-A2B0A7504C35}" dt="2021-05-13T13:58:36.042" v="754" actId="20577"/>
+        <pc:sldMkLst>
+          <pc:docMk/>
+          <pc:sldMk cId="0" sldId="263"/>
+        </pc:sldMkLst>
+        <pc:spChg chg="add mod">
+          <ac:chgData name="Cynthia Enciso" userId="7915927f-c5cf-4e1f-876d-e79882ad52fa" providerId="ADAL" clId="{A5DF6FD7-8000-40B2-B46A-A2B0A7504C35}" dt="2021-05-13T13:58:36.042" v="754" actId="20577"/>
+          <ac:spMkLst>
+            <pc:docMk/>
+            <pc:sldMk cId="0" sldId="263"/>
+            <ac:spMk id="2" creationId="{5C5A2562-1FAD-487B-95C6-159422001AAD}"/>
+          </ac:spMkLst>
+        </pc:spChg>
+      </pc:sldChg>
+      <pc:sldChg chg="modSp del mod">
+        <pc:chgData name="Cynthia Enciso" userId="7915927f-c5cf-4e1f-876d-e79882ad52fa" providerId="ADAL" clId="{A5DF6FD7-8000-40B2-B46A-A2B0A7504C35}" dt="2021-05-13T15:09:37.501" v="756" actId="47"/>
+        <pc:sldMkLst>
+          <pc:docMk/>
+          <pc:sldMk cId="0" sldId="265"/>
+        </pc:sldMkLst>
+        <pc:spChg chg="mod">
+          <ac:chgData name="Cynthia Enciso" userId="7915927f-c5cf-4e1f-876d-e79882ad52fa" providerId="ADAL" clId="{A5DF6FD7-8000-40B2-B46A-A2B0A7504C35}" dt="2021-05-13T15:03:53.591" v="755" actId="20577"/>
+          <ac:spMkLst>
+            <pc:docMk/>
+            <pc:sldMk cId="0" sldId="265"/>
+            <ac:spMk id="275" creationId="{00000000-0000-0000-0000-000000000000}"/>
+          </ac:spMkLst>
+        </pc:spChg>
+      </pc:sldChg>
+      <pc:sldChg chg="del">
+        <pc:chgData name="Cynthia Enciso" userId="7915927f-c5cf-4e1f-876d-e79882ad52fa" providerId="ADAL" clId="{A5DF6FD7-8000-40B2-B46A-A2B0A7504C35}" dt="2021-05-13T15:09:37.501" v="756" actId="47"/>
+        <pc:sldMkLst>
+          <pc:docMk/>
+          <pc:sldMk cId="0" sldId="266"/>
+        </pc:sldMkLst>
+      </pc:sldChg>
+      <pc:sldChg chg="addSp modSp mod">
+        <pc:chgData name="Cynthia Enciso" userId="7915927f-c5cf-4e1f-876d-e79882ad52fa" providerId="ADAL" clId="{A5DF6FD7-8000-40B2-B46A-A2B0A7504C35}" dt="2021-05-13T01:07:56.412" v="691" actId="20577"/>
+        <pc:sldMkLst>
+          <pc:docMk/>
+          <pc:sldMk cId="161632373" sldId="274"/>
+        </pc:sldMkLst>
+        <pc:spChg chg="add mod">
+          <ac:chgData name="Cynthia Enciso" userId="7915927f-c5cf-4e1f-876d-e79882ad52fa" providerId="ADAL" clId="{A5DF6FD7-8000-40B2-B46A-A2B0A7504C35}" dt="2021-05-13T01:07:56.412" v="691" actId="20577"/>
+          <ac:spMkLst>
+            <pc:docMk/>
+            <pc:sldMk cId="161632373" sldId="274"/>
+            <ac:spMk id="9" creationId="{03DAEC70-3A98-40F4-9BA8-7EC62A9DF887}"/>
+          </ac:spMkLst>
+        </pc:spChg>
+      </pc:sldChg>
+      <pc:sldChg chg="addSp modSp mod">
+        <pc:chgData name="Cynthia Enciso" userId="7915927f-c5cf-4e1f-876d-e79882ad52fa" providerId="ADAL" clId="{A5DF6FD7-8000-40B2-B46A-A2B0A7504C35}" dt="2021-05-13T01:08:02.824" v="702" actId="20577"/>
+        <pc:sldMkLst>
+          <pc:docMk/>
+          <pc:sldMk cId="2217254208" sldId="275"/>
+        </pc:sldMkLst>
+        <pc:spChg chg="add mod">
+          <ac:chgData name="Cynthia Enciso" userId="7915927f-c5cf-4e1f-876d-e79882ad52fa" providerId="ADAL" clId="{A5DF6FD7-8000-40B2-B46A-A2B0A7504C35}" dt="2021-05-13T01:08:02.824" v="702" actId="20577"/>
+          <ac:spMkLst>
+            <pc:docMk/>
+            <pc:sldMk cId="2217254208" sldId="275"/>
+            <ac:spMk id="3" creationId="{C3EC13CC-447D-4522-A147-EA6C7635768A}"/>
+          </ac:spMkLst>
+        </pc:spChg>
+        <pc:spChg chg="mod">
+          <ac:chgData name="Cynthia Enciso" userId="7915927f-c5cf-4e1f-876d-e79882ad52fa" providerId="ADAL" clId="{A5DF6FD7-8000-40B2-B46A-A2B0A7504C35}" dt="2021-05-13T00:37:41.840" v="671" actId="20577"/>
+          <ac:spMkLst>
+            <pc:docMk/>
+            <pc:sldMk cId="2217254208" sldId="275"/>
+            <ac:spMk id="6" creationId="{72C87E29-33CF-4D38-A874-906BF9E470BF}"/>
+          </ac:spMkLst>
+        </pc:spChg>
+      </pc:sldChg>
+      <pc:sldChg chg="addSp delSp modSp mod">
+        <pc:chgData name="Cynthia Enciso" userId="7915927f-c5cf-4e1f-876d-e79882ad52fa" providerId="ADAL" clId="{A5DF6FD7-8000-40B2-B46A-A2B0A7504C35}" dt="2021-05-12T19:06:37.231" v="667" actId="478"/>
+        <pc:sldMkLst>
+          <pc:docMk/>
+          <pc:sldMk cId="401115519" sldId="277"/>
+        </pc:sldMkLst>
+        <pc:spChg chg="add del mod">
+          <ac:chgData name="Cynthia Enciso" userId="7915927f-c5cf-4e1f-876d-e79882ad52fa" providerId="ADAL" clId="{A5DF6FD7-8000-40B2-B46A-A2B0A7504C35}" dt="2021-05-12T19:06:37.231" v="667" actId="478"/>
+          <ac:spMkLst>
+            <pc:docMk/>
+            <pc:sldMk cId="401115519" sldId="277"/>
+            <ac:spMk id="5" creationId="{BC2AC9E1-5FF1-43E6-A0E8-B98739FF59F5}"/>
+          </ac:spMkLst>
+        </pc:spChg>
+        <pc:spChg chg="add del mod">
+          <ac:chgData name="Cynthia Enciso" userId="7915927f-c5cf-4e1f-876d-e79882ad52fa" providerId="ADAL" clId="{A5DF6FD7-8000-40B2-B46A-A2B0A7504C35}" dt="2021-05-12T19:06:37.231" v="667" actId="478"/>
+          <ac:spMkLst>
+            <pc:docMk/>
+            <pc:sldMk cId="401115519" sldId="277"/>
+            <ac:spMk id="7" creationId="{00EC28CE-D4D5-492D-99E6-ADF60DAED5E0}"/>
+          </ac:spMkLst>
+        </pc:spChg>
+        <pc:spChg chg="add del mod">
+          <ac:chgData name="Cynthia Enciso" userId="7915927f-c5cf-4e1f-876d-e79882ad52fa" providerId="ADAL" clId="{A5DF6FD7-8000-40B2-B46A-A2B0A7504C35}" dt="2021-05-12T19:06:37.231" v="667" actId="478"/>
+          <ac:spMkLst>
+            <pc:docMk/>
+            <pc:sldMk cId="401115519" sldId="277"/>
+            <ac:spMk id="8" creationId="{16F8A9BF-D0A2-490B-8565-F84394B39199}"/>
+          </ac:spMkLst>
+        </pc:spChg>
+        <pc:spChg chg="add del mod">
+          <ac:chgData name="Cynthia Enciso" userId="7915927f-c5cf-4e1f-876d-e79882ad52fa" providerId="ADAL" clId="{A5DF6FD7-8000-40B2-B46A-A2B0A7504C35}" dt="2021-05-12T19:06:37.231" v="667" actId="478"/>
+          <ac:spMkLst>
+            <pc:docMk/>
+            <pc:sldMk cId="401115519" sldId="277"/>
+            <ac:spMk id="9" creationId="{8BACB54F-3215-461C-A98B-1DE17A74FF38}"/>
+          </ac:spMkLst>
+        </pc:spChg>
+        <pc:spChg chg="add del mod">
+          <ac:chgData name="Cynthia Enciso" userId="7915927f-c5cf-4e1f-876d-e79882ad52fa" providerId="ADAL" clId="{A5DF6FD7-8000-40B2-B46A-A2B0A7504C35}" dt="2021-05-12T19:06:37.231" v="667" actId="478"/>
+          <ac:spMkLst>
+            <pc:docMk/>
+            <pc:sldMk cId="401115519" sldId="277"/>
+            <ac:spMk id="10" creationId="{ED48520D-C161-42FA-91D2-F3CA20229511}"/>
+          </ac:spMkLst>
+        </pc:spChg>
+        <pc:spChg chg="add del mod">
+          <ac:chgData name="Cynthia Enciso" userId="7915927f-c5cf-4e1f-876d-e79882ad52fa" providerId="ADAL" clId="{A5DF6FD7-8000-40B2-B46A-A2B0A7504C35}" dt="2021-05-12T19:06:37.231" v="667" actId="478"/>
+          <ac:spMkLst>
+            <pc:docMk/>
+            <pc:sldMk cId="401115519" sldId="277"/>
+            <ac:spMk id="11" creationId="{79A09644-5AC3-49B4-A590-142F3077640A}"/>
+          </ac:spMkLst>
+        </pc:spChg>
+        <pc:spChg chg="add del mod">
+          <ac:chgData name="Cynthia Enciso" userId="7915927f-c5cf-4e1f-876d-e79882ad52fa" providerId="ADAL" clId="{A5DF6FD7-8000-40B2-B46A-A2B0A7504C35}" dt="2021-05-12T19:06:37.231" v="667" actId="478"/>
+          <ac:spMkLst>
+            <pc:docMk/>
+            <pc:sldMk cId="401115519" sldId="277"/>
+            <ac:spMk id="12" creationId="{58127662-FDB3-484E-8C82-4DE4158F794C}"/>
+          </ac:spMkLst>
+        </pc:spChg>
+        <pc:spChg chg="add del mod">
+          <ac:chgData name="Cynthia Enciso" userId="7915927f-c5cf-4e1f-876d-e79882ad52fa" providerId="ADAL" clId="{A5DF6FD7-8000-40B2-B46A-A2B0A7504C35}" dt="2021-05-12T18:26:09.847" v="354"/>
+          <ac:spMkLst>
+            <pc:docMk/>
+            <pc:sldMk cId="401115519" sldId="277"/>
+            <ac:spMk id="13" creationId="{3A882556-C4C2-41C1-94B6-44156227BF34}"/>
+          </ac:spMkLst>
+        </pc:spChg>
+        <pc:spChg chg="add del mod">
+          <ac:chgData name="Cynthia Enciso" userId="7915927f-c5cf-4e1f-876d-e79882ad52fa" providerId="ADAL" clId="{A5DF6FD7-8000-40B2-B46A-A2B0A7504C35}" dt="2021-05-12T19:06:37.231" v="667" actId="478"/>
+          <ac:spMkLst>
+            <pc:docMk/>
+            <pc:sldMk cId="401115519" sldId="277"/>
+            <ac:spMk id="14" creationId="{153AA97F-9544-4867-A96A-49975AB5E8E2}"/>
+          </ac:spMkLst>
+        </pc:spChg>
+        <pc:spChg chg="add del mod">
+          <ac:chgData name="Cynthia Enciso" userId="7915927f-c5cf-4e1f-876d-e79882ad52fa" providerId="ADAL" clId="{A5DF6FD7-8000-40B2-B46A-A2B0A7504C35}" dt="2021-05-12T19:06:37.231" v="667" actId="478"/>
+          <ac:spMkLst>
+            <pc:docMk/>
+            <pc:sldMk cId="401115519" sldId="277"/>
+            <ac:spMk id="15" creationId="{37E41A40-65C7-4F58-9BF1-ABAB0C95084F}"/>
+          </ac:spMkLst>
+        </pc:spChg>
+        <pc:spChg chg="add del mod">
+          <ac:chgData name="Cynthia Enciso" userId="7915927f-c5cf-4e1f-876d-e79882ad52fa" providerId="ADAL" clId="{A5DF6FD7-8000-40B2-B46A-A2B0A7504C35}" dt="2021-05-12T19:06:37.231" v="667" actId="478"/>
+          <ac:spMkLst>
+            <pc:docMk/>
+            <pc:sldMk cId="401115519" sldId="277"/>
+            <ac:spMk id="16" creationId="{DBF0276C-59F9-4DE3-BB5C-FB71F024D8FC}"/>
+          </ac:spMkLst>
+        </pc:spChg>
+        <pc:spChg chg="add del mod">
+          <ac:chgData name="Cynthia Enciso" userId="7915927f-c5cf-4e1f-876d-e79882ad52fa" providerId="ADAL" clId="{A5DF6FD7-8000-40B2-B46A-A2B0A7504C35}" dt="2021-05-12T19:06:37.231" v="667" actId="478"/>
+          <ac:spMkLst>
+            <pc:docMk/>
+            <pc:sldMk cId="401115519" sldId="277"/>
+            <ac:spMk id="17" creationId="{56DAA60E-AEED-4D1E-BAF1-D60B89B96368}"/>
+          </ac:spMkLst>
+        </pc:spChg>
+        <pc:spChg chg="add del mod">
+          <ac:chgData name="Cynthia Enciso" userId="7915927f-c5cf-4e1f-876d-e79882ad52fa" providerId="ADAL" clId="{A5DF6FD7-8000-40B2-B46A-A2B0A7504C35}" dt="2021-05-12T18:51:51.005" v="663" actId="478"/>
+          <ac:spMkLst>
+            <pc:docMk/>
+            <pc:sldMk cId="401115519" sldId="277"/>
+            <ac:spMk id="18" creationId="{F5B6587D-4033-4FF9-8573-0CDF4D84D5E1}"/>
+          </ac:spMkLst>
+        </pc:spChg>
+        <pc:spChg chg="add del">
+          <ac:chgData name="Cynthia Enciso" userId="7915927f-c5cf-4e1f-876d-e79882ad52fa" providerId="ADAL" clId="{A5DF6FD7-8000-40B2-B46A-A2B0A7504C35}" dt="2021-05-12T19:06:25.711" v="665" actId="22"/>
+          <ac:spMkLst>
+            <pc:docMk/>
+            <pc:sldMk cId="401115519" sldId="277"/>
+            <ac:spMk id="20" creationId="{AEBA135D-71F5-4C3A-B6BE-D6872FD06468}"/>
+          </ac:spMkLst>
+        </pc:spChg>
+      </pc:sldChg>
+      <pc:sldChg chg="addSp modSp mod">
+        <pc:chgData name="Cynthia Enciso" userId="7915927f-c5cf-4e1f-876d-e79882ad52fa" providerId="ADAL" clId="{A5DF6FD7-8000-40B2-B46A-A2B0A7504C35}" dt="2021-05-13T13:47:55.607" v="734" actId="5793"/>
+        <pc:sldMkLst>
+          <pc:docMk/>
+          <pc:sldMk cId="828568026" sldId="278"/>
+        </pc:sldMkLst>
+        <pc:spChg chg="add mod">
+          <ac:chgData name="Cynthia Enciso" userId="7915927f-c5cf-4e1f-876d-e79882ad52fa" providerId="ADAL" clId="{A5DF6FD7-8000-40B2-B46A-A2B0A7504C35}" dt="2021-05-13T13:47:55.607" v="734" actId="5793"/>
+          <ac:spMkLst>
+            <pc:docMk/>
+            <pc:sldMk cId="828568026" sldId="278"/>
+            <ac:spMk id="3" creationId="{AFFDEB83-A66E-4A4E-BAB1-870E0B7F82FC}"/>
+          </ac:spMkLst>
+        </pc:spChg>
+      </pc:sldChg>
+      <pc:sldChg chg="addSp modSp add del mod">
+        <pc:chgData name="Cynthia Enciso" userId="7915927f-c5cf-4e1f-876d-e79882ad52fa" providerId="ADAL" clId="{A5DF6FD7-8000-40B2-B46A-A2B0A7504C35}" dt="2021-05-13T20:48:20.141" v="757" actId="47"/>
+        <pc:sldMkLst>
+          <pc:docMk/>
+          <pc:sldMk cId="2118025839" sldId="280"/>
+        </pc:sldMkLst>
+        <pc:spChg chg="add mod">
+          <ac:chgData name="Cynthia Enciso" userId="7915927f-c5cf-4e1f-876d-e79882ad52fa" providerId="ADAL" clId="{A5DF6FD7-8000-40B2-B46A-A2B0A7504C35}" dt="2021-05-13T12:51:22.302" v="715" actId="1076"/>
+          <ac:spMkLst>
+            <pc:docMk/>
+            <pc:sldMk cId="2118025839" sldId="280"/>
+            <ac:spMk id="13" creationId="{47735A0F-0F31-459E-A4AC-84AA92B89ACC}"/>
+          </ac:spMkLst>
+        </pc:spChg>
+      </pc:sldChg>
+      <pc:sldChg chg="addSp delSp modSp new mod">
+        <pc:chgData name="Cynthia Enciso" userId="7915927f-c5cf-4e1f-876d-e79882ad52fa" providerId="ADAL" clId="{A5DF6FD7-8000-40B2-B46A-A2B0A7504C35}" dt="2021-05-13T21:09:00.823" v="784" actId="1076"/>
+        <pc:sldMkLst>
+          <pc:docMk/>
+          <pc:sldMk cId="2675953329" sldId="280"/>
+        </pc:sldMkLst>
+        <pc:spChg chg="del">
+          <ac:chgData name="Cynthia Enciso" userId="7915927f-c5cf-4e1f-876d-e79882ad52fa" providerId="ADAL" clId="{A5DF6FD7-8000-40B2-B46A-A2B0A7504C35}" dt="2021-05-13T21:06:37.891" v="759" actId="478"/>
+          <ac:spMkLst>
+            <pc:docMk/>
+            <pc:sldMk cId="2675953329" sldId="280"/>
+            <ac:spMk id="3" creationId="{CBCF5C6C-6E81-49DC-8008-DF8E74A8B8A9}"/>
+          </ac:spMkLst>
+        </pc:spChg>
+        <pc:spChg chg="add mod">
+          <ac:chgData name="Cynthia Enciso" userId="7915927f-c5cf-4e1f-876d-e79882ad52fa" providerId="ADAL" clId="{A5DF6FD7-8000-40B2-B46A-A2B0A7504C35}" dt="2021-05-13T21:06:42.714" v="761" actId="13822"/>
+          <ac:spMkLst>
+            <pc:docMk/>
+            <pc:sldMk cId="2675953329" sldId="280"/>
+            <ac:spMk id="5" creationId="{1BB1D7CF-36ED-426C-AF8C-F899B2DC8C5C}"/>
+          </ac:spMkLst>
+        </pc:spChg>
+        <pc:spChg chg="add mod">
+          <ac:chgData name="Cynthia Enciso" userId="7915927f-c5cf-4e1f-876d-e79882ad52fa" providerId="ADAL" clId="{A5DF6FD7-8000-40B2-B46A-A2B0A7504C35}" dt="2021-05-13T21:07:32.670" v="770" actId="14100"/>
+          <ac:spMkLst>
+            <pc:docMk/>
+            <pc:sldMk cId="2675953329" sldId="280"/>
+            <ac:spMk id="6" creationId="{1ABE50C8-E47E-4CC8-A329-20BD33C449B1}"/>
+          </ac:spMkLst>
+        </pc:spChg>
+        <pc:spChg chg="add mod">
+          <ac:chgData name="Cynthia Enciso" userId="7915927f-c5cf-4e1f-876d-e79882ad52fa" providerId="ADAL" clId="{A5DF6FD7-8000-40B2-B46A-A2B0A7504C35}" dt="2021-05-13T21:07:22.878" v="765" actId="1076"/>
+          <ac:spMkLst>
+            <pc:docMk/>
+            <pc:sldMk cId="2675953329" sldId="280"/>
+            <ac:spMk id="7" creationId="{14A97818-23E6-446C-AC14-D0A74D3CCFCC}"/>
+          </ac:spMkLst>
+        </pc:spChg>
+        <pc:spChg chg="add mod">
+          <ac:chgData name="Cynthia Enciso" userId="7915927f-c5cf-4e1f-876d-e79882ad52fa" providerId="ADAL" clId="{A5DF6FD7-8000-40B2-B46A-A2B0A7504C35}" dt="2021-05-13T21:07:24.971" v="766" actId="571"/>
+          <ac:spMkLst>
+            <pc:docMk/>
+            <pc:sldMk cId="2675953329" sldId="280"/>
+            <ac:spMk id="8" creationId="{1E819EEF-8215-4759-8EAF-EAD2218B1FB6}"/>
+          </ac:spMkLst>
+        </pc:spChg>
+        <pc:spChg chg="add mod">
+          <ac:chgData name="Cynthia Enciso" userId="7915927f-c5cf-4e1f-876d-e79882ad52fa" providerId="ADAL" clId="{A5DF6FD7-8000-40B2-B46A-A2B0A7504C35}" dt="2021-05-13T21:07:26.071" v="767" actId="571"/>
+          <ac:spMkLst>
+            <pc:docMk/>
+            <pc:sldMk cId="2675953329" sldId="280"/>
+            <ac:spMk id="9" creationId="{5850E483-D930-4C04-B412-79CA45D1AC8C}"/>
+          </ac:spMkLst>
+        </pc:spChg>
+        <pc:spChg chg="add mod">
+          <ac:chgData name="Cynthia Enciso" userId="7915927f-c5cf-4e1f-876d-e79882ad52fa" providerId="ADAL" clId="{A5DF6FD7-8000-40B2-B46A-A2B0A7504C35}" dt="2021-05-13T21:07:27.290" v="768" actId="571"/>
+          <ac:spMkLst>
+            <pc:docMk/>
+            <pc:sldMk cId="2675953329" sldId="280"/>
+            <ac:spMk id="10" creationId="{E1F90C20-0381-4F46-86C4-445E6E868350}"/>
+          </ac:spMkLst>
+        </pc:spChg>
+        <pc:spChg chg="add mod">
+          <ac:chgData name="Cynthia Enciso" userId="7915927f-c5cf-4e1f-876d-e79882ad52fa" providerId="ADAL" clId="{A5DF6FD7-8000-40B2-B46A-A2B0A7504C35}" dt="2021-05-13T21:07:29.794" v="769" actId="571"/>
+          <ac:spMkLst>
+            <pc:docMk/>
+            <pc:sldMk cId="2675953329" sldId="280"/>
+            <ac:spMk id="11" creationId="{03ECB692-08BE-4332-A356-DD47D370E3A8}"/>
+          </ac:spMkLst>
+        </pc:spChg>
+        <pc:spChg chg="add mod">
+          <ac:chgData name="Cynthia Enciso" userId="7915927f-c5cf-4e1f-876d-e79882ad52fa" providerId="ADAL" clId="{A5DF6FD7-8000-40B2-B46A-A2B0A7504C35}" dt="2021-05-13T21:08:08.110" v="775" actId="14100"/>
+          <ac:spMkLst>
+            <pc:docMk/>
+            <pc:sldMk cId="2675953329" sldId="280"/>
+            <ac:spMk id="12" creationId="{139B5649-7922-42CC-90E1-9C8F00DB11E8}"/>
+          </ac:spMkLst>
+        </pc:spChg>
+        <pc:spChg chg="add mod">
+          <ac:chgData name="Cynthia Enciso" userId="7915927f-c5cf-4e1f-876d-e79882ad52fa" providerId="ADAL" clId="{A5DF6FD7-8000-40B2-B46A-A2B0A7504C35}" dt="2021-05-13T21:08:42.485" v="779" actId="1076"/>
+          <ac:spMkLst>
+            <pc:docMk/>
+            <pc:sldMk cId="2675953329" sldId="280"/>
+            <ac:spMk id="13" creationId="{A108B2E6-09A8-4E0A-84B2-80BD7AC04147}"/>
+          </ac:spMkLst>
+        </pc:spChg>
+        <pc:spChg chg="add mod">
+          <ac:chgData name="Cynthia Enciso" userId="7915927f-c5cf-4e1f-876d-e79882ad52fa" providerId="ADAL" clId="{A5DF6FD7-8000-40B2-B46A-A2B0A7504C35}" dt="2021-05-13T21:09:00.823" v="784" actId="1076"/>
+          <ac:spMkLst>
+            <pc:docMk/>
+            <pc:sldMk cId="2675953329" sldId="280"/>
+            <ac:spMk id="17" creationId="{87B37B94-B12E-46E4-98C5-A102FFB69452}"/>
+          </ac:spMkLst>
+        </pc:spChg>
+        <pc:cxnChg chg="add mod">
+          <ac:chgData name="Cynthia Enciso" userId="7915927f-c5cf-4e1f-876d-e79882ad52fa" providerId="ADAL" clId="{A5DF6FD7-8000-40B2-B46A-A2B0A7504C35}" dt="2021-05-13T21:08:41.357" v="778" actId="14100"/>
+          <ac:cxnSpMkLst>
+            <pc:docMk/>
+            <pc:sldMk cId="2675953329" sldId="280"/>
+            <ac:cxnSpMk id="15" creationId="{62F06C4F-5EC5-44C4-92A3-A8EA05733A34}"/>
+          </ac:cxnSpMkLst>
+        </pc:cxnChg>
+        <pc:cxnChg chg="add del mod">
+          <ac:chgData name="Cynthia Enciso" userId="7915927f-c5cf-4e1f-876d-e79882ad52fa" providerId="ADAL" clId="{A5DF6FD7-8000-40B2-B46A-A2B0A7504C35}" dt="2021-05-13T21:08:54.386" v="783" actId="478"/>
+          <ac:cxnSpMkLst>
+            <pc:docMk/>
+            <pc:sldMk cId="2675953329" sldId="280"/>
+            <ac:cxnSpMk id="18" creationId="{37CF9E88-0FC8-4355-B7BE-B0499C706A27}"/>
+          </ac:cxnSpMkLst>
+        </pc:cxnChg>
+      </pc:sldChg>
+    </pc:docChg>
+  </pc:docChgLst>
+  <pc:docChgLst>
     <pc:chgData name="Cynthia Enciso" userId="7915927f-c5cf-4e1f-876d-e79882ad52fa" providerId="ADAL" clId="{AAEA3E75-A5E5-4037-B7DF-D30820629B19}"/>
     <pc:docChg chg="custSel addSld modSld sldOrd">
       <pc:chgData name="Cynthia Enciso" userId="7915927f-c5cf-4e1f-876d-e79882ad52fa" providerId="ADAL" clId="{AAEA3E75-A5E5-4037-B7DF-D30820629B19}" dt="2021-06-17T21:08:05.813" v="609" actId="1076"/>
@@ -2261,6 +2127,140 @@
             <pc:docMk/>
             <pc:sldMk cId="3541185766" sldId="281"/>
             <ac:spMk id="3" creationId="{C9C37168-9323-4271-B5C0-B148716F49FB}"/>
+          </ac:spMkLst>
+        </pc:spChg>
+      </pc:sldChg>
+    </pc:docChg>
+  </pc:docChgLst>
+  <pc:docChgLst>
+    <pc:chgData name="Joseph Highe" userId="S::joseph.highe@revature.com::955b9bf1-2fc3-425c-bb80-056211376f04" providerId="AD" clId="Web-{10C310BF-F551-0215-7D17-CE173A4BBDCC}"/>
+    <pc:docChg chg="addSld modSld">
+      <pc:chgData name="Joseph Highe" userId="S::joseph.highe@revature.com::955b9bf1-2fc3-425c-bb80-056211376f04" providerId="AD" clId="Web-{10C310BF-F551-0215-7D17-CE173A4BBDCC}" dt="2021-12-24T17:05:49.331" v="459" actId="14100"/>
+      <pc:docMkLst>
+        <pc:docMk/>
+      </pc:docMkLst>
+      <pc:sldChg chg="modSp">
+        <pc:chgData name="Joseph Highe" userId="S::joseph.highe@revature.com::955b9bf1-2fc3-425c-bb80-056211376f04" providerId="AD" clId="Web-{10C310BF-F551-0215-7D17-CE173A4BBDCC}" dt="2021-12-24T16:48:27.462" v="49" actId="20577"/>
+        <pc:sldMkLst>
+          <pc:docMk/>
+          <pc:sldMk cId="0" sldId="262"/>
+        </pc:sldMkLst>
+        <pc:spChg chg="mod">
+          <ac:chgData name="Joseph Highe" userId="S::joseph.highe@revature.com::955b9bf1-2fc3-425c-bb80-056211376f04" providerId="AD" clId="Web-{10C310BF-F551-0215-7D17-CE173A4BBDCC}" dt="2021-12-24T16:48:18.853" v="47" actId="1076"/>
+          <ac:spMkLst>
+            <pc:docMk/>
+            <pc:sldMk cId="0" sldId="262"/>
+            <ac:spMk id="6" creationId="{5CCE257A-38BD-4F10-8176-6373BF55BA2A}"/>
+          </ac:spMkLst>
+        </pc:spChg>
+        <pc:spChg chg="mod">
+          <ac:chgData name="Joseph Highe" userId="S::joseph.highe@revature.com::955b9bf1-2fc3-425c-bb80-056211376f04" providerId="AD" clId="Web-{10C310BF-F551-0215-7D17-CE173A4BBDCC}" dt="2021-12-24T16:48:23.134" v="48" actId="1076"/>
+          <ac:spMkLst>
+            <pc:docMk/>
+            <pc:sldMk cId="0" sldId="262"/>
+            <ac:spMk id="7" creationId="{1A3779DF-3EE1-4B7F-8555-C8D3593FFED9}"/>
+          </ac:spMkLst>
+        </pc:spChg>
+        <pc:spChg chg="mod">
+          <ac:chgData name="Joseph Highe" userId="S::joseph.highe@revature.com::955b9bf1-2fc3-425c-bb80-056211376f04" providerId="AD" clId="Web-{10C310BF-F551-0215-7D17-CE173A4BBDCC}" dt="2021-12-24T16:48:27.462" v="49" actId="20577"/>
+          <ac:spMkLst>
+            <pc:docMk/>
+            <pc:sldMk cId="0" sldId="262"/>
+            <ac:spMk id="254" creationId="{00000000-0000-0000-0000-000000000000}"/>
+          </ac:spMkLst>
+        </pc:spChg>
+      </pc:sldChg>
+      <pc:sldChg chg="addSp delSp modSp add replId">
+        <pc:chgData name="Joseph Highe" userId="S::joseph.highe@revature.com::955b9bf1-2fc3-425c-bb80-056211376f04" providerId="AD" clId="Web-{10C310BF-F551-0215-7D17-CE173A4BBDCC}" dt="2021-12-24T17:05:49.331" v="459" actId="14100"/>
+        <pc:sldMkLst>
+          <pc:docMk/>
+          <pc:sldMk cId="2163507849" sldId="294"/>
+        </pc:sldMkLst>
+        <pc:spChg chg="del">
+          <ac:chgData name="Joseph Highe" userId="S::joseph.highe@revature.com::955b9bf1-2fc3-425c-bb80-056211376f04" providerId="AD" clId="Web-{10C310BF-F551-0215-7D17-CE173A4BBDCC}" dt="2021-12-24T16:49:41.338" v="51"/>
+          <ac:spMkLst>
+            <pc:docMk/>
+            <pc:sldMk cId="2163507849" sldId="294"/>
+            <ac:spMk id="3" creationId="{CA870295-970A-4734-B83A-E32B1B7CC83E}"/>
+          </ac:spMkLst>
+        </pc:spChg>
+        <pc:spChg chg="add del mod">
+          <ac:chgData name="Joseph Highe" userId="S::joseph.highe@revature.com::955b9bf1-2fc3-425c-bb80-056211376f04" providerId="AD" clId="Web-{10C310BF-F551-0215-7D17-CE173A4BBDCC}" dt="2021-12-24T16:49:46.854" v="54"/>
+          <ac:spMkLst>
+            <pc:docMk/>
+            <pc:sldMk cId="2163507849" sldId="294"/>
+            <ac:spMk id="6" creationId="{3695CAE3-7743-4864-B857-15D12125EA95}"/>
+          </ac:spMkLst>
+        </pc:spChg>
+        <pc:spChg chg="add del mod">
+          <ac:chgData name="Joseph Highe" userId="S::joseph.highe@revature.com::955b9bf1-2fc3-425c-bb80-056211376f04" providerId="AD" clId="Web-{10C310BF-F551-0215-7D17-CE173A4BBDCC}" dt="2021-12-24T16:55:58.161" v="188"/>
+          <ac:spMkLst>
+            <pc:docMk/>
+            <pc:sldMk cId="2163507849" sldId="294"/>
+            <ac:spMk id="8" creationId="{F6A7CD23-4176-4A80-ACAE-55590C8BBFFA}"/>
+          </ac:spMkLst>
+        </pc:spChg>
+        <pc:spChg chg="add mod">
+          <ac:chgData name="Joseph Highe" userId="S::joseph.highe@revature.com::955b9bf1-2fc3-425c-bb80-056211376f04" providerId="AD" clId="Web-{10C310BF-F551-0215-7D17-CE173A4BBDCC}" dt="2021-12-24T17:05:34.456" v="457" actId="1076"/>
+          <ac:spMkLst>
+            <pc:docMk/>
+            <pc:sldMk cId="2163507849" sldId="294"/>
+            <ac:spMk id="10" creationId="{AB67DE77-F187-47EC-A611-083F2D66EAE7}"/>
+          </ac:spMkLst>
+        </pc:spChg>
+        <pc:spChg chg="add mod">
+          <ac:chgData name="Joseph Highe" userId="S::joseph.highe@revature.com::955b9bf1-2fc3-425c-bb80-056211376f04" providerId="AD" clId="Web-{10C310BF-F551-0215-7D17-CE173A4BBDCC}" dt="2021-12-24T17:05:49.331" v="459" actId="14100"/>
+          <ac:spMkLst>
+            <pc:docMk/>
+            <pc:sldMk cId="2163507849" sldId="294"/>
+            <ac:spMk id="11" creationId="{9CC98ADD-CAB9-47EB-87D6-4AF431D707D9}"/>
+          </ac:spMkLst>
+        </pc:spChg>
+      </pc:sldChg>
+    </pc:docChg>
+  </pc:docChgLst>
+  <pc:docChgLst>
+    <pc:chgData name="Cynthia Enciso" userId="7915927f-c5cf-4e1f-876d-e79882ad52fa" providerId="ADAL" clId="{007E3B92-AEC5-49E9-A0ED-D9E41C77BCEC}"/>
+    <pc:docChg chg="custSel modSld">
+      <pc:chgData name="Cynthia Enciso" userId="7915927f-c5cf-4e1f-876d-e79882ad52fa" providerId="ADAL" clId="{007E3B92-AEC5-49E9-A0ED-D9E41C77BCEC}" dt="2021-12-27T20:43:27.215" v="115" actId="20577"/>
+      <pc:docMkLst>
+        <pc:docMk/>
+      </pc:docMkLst>
+      <pc:sldChg chg="addSp delSp modSp mod">
+        <pc:chgData name="Cynthia Enciso" userId="7915927f-c5cf-4e1f-876d-e79882ad52fa" providerId="ADAL" clId="{007E3B92-AEC5-49E9-A0ED-D9E41C77BCEC}" dt="2021-12-14T21:48:58.242" v="2"/>
+        <pc:sldMkLst>
+          <pc:docMk/>
+          <pc:sldMk cId="0" sldId="259"/>
+        </pc:sldMkLst>
+        <pc:spChg chg="add mod">
+          <ac:chgData name="Cynthia Enciso" userId="7915927f-c5cf-4e1f-876d-e79882ad52fa" providerId="ADAL" clId="{007E3B92-AEC5-49E9-A0ED-D9E41C77BCEC}" dt="2021-12-14T21:48:58.242" v="2"/>
+          <ac:spMkLst>
+            <pc:docMk/>
+            <pc:sldMk cId="0" sldId="259"/>
+            <ac:spMk id="6" creationId="{9CB3CF3A-4EB5-4C02-A6F6-3ED9D20DEDAC}"/>
+          </ac:spMkLst>
+        </pc:spChg>
+        <pc:spChg chg="del mod">
+          <ac:chgData name="Cynthia Enciso" userId="7915927f-c5cf-4e1f-876d-e79882ad52fa" providerId="ADAL" clId="{007E3B92-AEC5-49E9-A0ED-D9E41C77BCEC}" dt="2021-12-14T21:48:57.965" v="1" actId="478"/>
+          <ac:spMkLst>
+            <pc:docMk/>
+            <pc:sldMk cId="0" sldId="259"/>
+            <ac:spMk id="7" creationId="{E58A825B-5F0A-4223-9EE9-4074AE300333}"/>
+          </ac:spMkLst>
+        </pc:spChg>
+      </pc:sldChg>
+      <pc:sldChg chg="modSp mod">
+        <pc:chgData name="Cynthia Enciso" userId="7915927f-c5cf-4e1f-876d-e79882ad52fa" providerId="ADAL" clId="{007E3B92-AEC5-49E9-A0ED-D9E41C77BCEC}" dt="2021-12-27T20:43:27.215" v="115" actId="20577"/>
+        <pc:sldMkLst>
+          <pc:docMk/>
+          <pc:sldMk cId="0" sldId="261"/>
+        </pc:sldMkLst>
+        <pc:spChg chg="mod">
+          <ac:chgData name="Cynthia Enciso" userId="7915927f-c5cf-4e1f-876d-e79882ad52fa" providerId="ADAL" clId="{007E3B92-AEC5-49E9-A0ED-D9E41C77BCEC}" dt="2021-12-27T20:43:27.215" v="115" actId="20577"/>
+          <ac:spMkLst>
+            <pc:docMk/>
+            <pc:sldMk cId="0" sldId="261"/>
+            <ac:spMk id="247" creationId="{00000000-0000-0000-0000-000000000000}"/>
           </ac:spMkLst>
         </pc:spChg>
       </pc:sldChg>
@@ -31313,8 +31313,8 @@
         </p:nvSpPr>
         <p:spPr>
           <a:xfrm>
-            <a:off x="159572" y="2707584"/>
-            <a:ext cx="8826500" cy="5951538"/>
+            <a:off x="158750" y="2437945"/>
+            <a:ext cx="8826500" cy="1982110"/>
           </a:xfrm>
         </p:spPr>
         <p:txBody>
@@ -33083,8 +33083,8 @@
         </p:nvSpPr>
         <p:spPr>
           <a:xfrm>
-            <a:off x="159572" y="2707584"/>
-            <a:ext cx="8826500" cy="5951538"/>
+            <a:off x="158750" y="2316983"/>
+            <a:ext cx="8826500" cy="2224034"/>
           </a:xfrm>
         </p:spPr>
         <p:txBody>
@@ -33891,8 +33891,8 @@
         </p:nvSpPr>
         <p:spPr>
           <a:xfrm>
-            <a:off x="159572" y="2707584"/>
-            <a:ext cx="8826500" cy="5951538"/>
+            <a:off x="157928" y="2384060"/>
+            <a:ext cx="8826500" cy="2089880"/>
           </a:xfrm>
         </p:spPr>
         <p:txBody>
@@ -38886,6 +38886,23 @@
 </file>
 
 <file path=customXml/item1.xml><?xml version="1.0" encoding="utf-8"?>
+<p:properties xmlns:p="http://schemas.microsoft.com/office/2006/metadata/properties" xmlns:xsi="http://www.w3.org/2001/XMLSchema-instance" xmlns:pc="http://schemas.microsoft.com/office/infopath/2007/PartnerControls">
+  <documentManagement>
+    <Details xmlns="16399201-8c70-4094-bedf-0e0052933be2" xsi:nil="true"/>
+  </documentManagement>
+</p:properties>
+</file>
+
+<file path=customXml/item2.xml><?xml version="1.0" encoding="utf-8"?>
+<?mso-contentType ?>
+<FormTemplates xmlns="http://schemas.microsoft.com/sharepoint/v3/contenttype/forms">
+  <Display>DocumentLibraryForm</Display>
+  <Edit>DocumentLibraryForm</Edit>
+  <New>DocumentLibraryForm</New>
+</FormTemplates>
+</file>
+
+<file path=customXml/item3.xml><?xml version="1.0" encoding="utf-8"?>
 <ct:contentTypeSchema xmlns:ct="http://schemas.microsoft.com/office/2006/metadata/contentType" xmlns:ma="http://schemas.microsoft.com/office/2006/metadata/properties/metaAttributes" ct:_="" ma:_="" ma:contentTypeName="Document" ma:contentTypeID="0x0101008BD2F010722D7D4D902378845F41F1B2" ma:contentTypeVersion="13" ma:contentTypeDescription="Create a new document." ma:contentTypeScope="" ma:versionID="b68d56871977609000cd171c9412956f">
   <xsd:schema xmlns:xsd="http://www.w3.org/2001/XMLSchema" xmlns:xs="http://www.w3.org/2001/XMLSchema" xmlns:p="http://schemas.microsoft.com/office/2006/metadata/properties" xmlns:ns2="16399201-8c70-4094-bedf-0e0052933be2" xmlns:ns3="c1d1d668-1a17-41cc-8e51-02c957e8f86c" targetNamespace="http://schemas.microsoft.com/office/2006/metadata/properties" ma:root="true" ma:fieldsID="8d4e77ac156dfa649f0a05adbe1f888e" ns2:_="" ns3:_="">
     <xsd:import namespace="16399201-8c70-4094-bedf-0e0052933be2"/>
@@ -39110,31 +39127,39 @@
 </ct:contentTypeSchema>
 </file>
 
-<file path=customXml/item2.xml><?xml version="1.0" encoding="utf-8"?>
-<?mso-contentType ?>
-<FormTemplates xmlns="http://schemas.microsoft.com/sharepoint/v3/contenttype/forms">
-  <Display>DocumentLibraryForm</Display>
-  <Edit>DocumentLibraryForm</Edit>
-  <New>DocumentLibraryForm</New>
-</FormTemplates>
-</file>
-
-<file path=customXml/item3.xml><?xml version="1.0" encoding="utf-8"?>
-<p:properties xmlns:p="http://schemas.microsoft.com/office/2006/metadata/properties" xmlns:xsi="http://www.w3.org/2001/XMLSchema-instance" xmlns:pc="http://schemas.microsoft.com/office/infopath/2007/PartnerControls">
-  <documentManagement>
-    <Details xmlns="16399201-8c70-4094-bedf-0e0052933be2" xsi:nil="true"/>
-  </documentManagement>
-</p:properties>
-</file>
-
 <file path=customXml/itemProps1.xml><?xml version="1.0" encoding="utf-8"?>
-<ds:datastoreItem xmlns:ds="http://schemas.openxmlformats.org/officeDocument/2006/customXml" ds:itemID="{21B51190-862E-4988-B16E-B19854D815B8}"/>
+<ds:datastoreItem xmlns:ds="http://schemas.openxmlformats.org/officeDocument/2006/customXml" ds:itemID="{6ABEF5F4-6DFF-4A9D-A2FC-F3549513975D}">
+  <ds:schemaRefs>
+    <ds:schemaRef ds:uri="http://schemas.microsoft.com/office/2006/metadata/properties"/>
+    <ds:schemaRef ds:uri="http://schemas.microsoft.com/office/infopath/2007/PartnerControls"/>
+    <ds:schemaRef ds:uri="16399201-8c70-4094-bedf-0e0052933be2"/>
+  </ds:schemaRefs>
+</ds:datastoreItem>
 </file>
 
 <file path=customXml/itemProps2.xml><?xml version="1.0" encoding="utf-8"?>
-<ds:datastoreItem xmlns:ds="http://schemas.openxmlformats.org/officeDocument/2006/customXml" ds:itemID="{C0252957-5E58-4977-8206-E190078F933F}"/>
+<ds:datastoreItem xmlns:ds="http://schemas.openxmlformats.org/officeDocument/2006/customXml" ds:itemID="{C0252957-5E58-4977-8206-E190078F933F}">
+  <ds:schemaRefs>
+    <ds:schemaRef ds:uri="http://schemas.microsoft.com/sharepoint/v3/contenttype/forms"/>
+  </ds:schemaRefs>
+</ds:datastoreItem>
 </file>
 
 <file path=customXml/itemProps3.xml><?xml version="1.0" encoding="utf-8"?>
-<ds:datastoreItem xmlns:ds="http://schemas.openxmlformats.org/officeDocument/2006/customXml" ds:itemID="{6ABEF5F4-6DFF-4A9D-A2FC-F3549513975D}"/>
+<ds:datastoreItem xmlns:ds="http://schemas.openxmlformats.org/officeDocument/2006/customXml" ds:itemID="{21B51190-862E-4988-B16E-B19854D815B8}">
+  <ds:schemaRefs>
+    <ds:schemaRef ds:uri="http://schemas.microsoft.com/office/2006/metadata/contentType"/>
+    <ds:schemaRef ds:uri="http://schemas.microsoft.com/office/2006/metadata/properties/metaAttributes"/>
+    <ds:schemaRef ds:uri="http://www.w3.org/2001/XMLSchema"/>
+    <ds:schemaRef ds:uri="http://schemas.microsoft.com/office/2006/metadata/properties"/>
+    <ds:schemaRef ds:uri="16399201-8c70-4094-bedf-0e0052933be2"/>
+    <ds:schemaRef ds:uri="c1d1d668-1a17-41cc-8e51-02c957e8f86c"/>
+    <ds:schemaRef ds:uri="http://schemas.microsoft.com/office/2006/documentManagement/types"/>
+    <ds:schemaRef ds:uri="http://schemas.microsoft.com/office/infopath/2007/PartnerControls"/>
+    <ds:schemaRef ds:uri="http://schemas.openxmlformats.org/package/2006/metadata/core-properties"/>
+    <ds:schemaRef ds:uri="http://purl.org/dc/elements/1.1/"/>
+    <ds:schemaRef ds:uri="http://purl.org/dc/terms/"/>
+    <ds:schemaRef ds:uri="http://schemas.microsoft.com/internal/obd"/>
+  </ds:schemaRefs>
+</ds:datastoreItem>
 </file>
</xml_diff>